<commit_message>
Final Wording. Needs Notes
</commit_message>
<xml_diff>
--- a/Presentations/December 9, 2013/final presentation.pptx
+++ b/Presentations/December 9, 2013/final presentation.pptx
@@ -29390,12 +29390,9 @@
           </a:bodyPr>
           <a:lstStyle/>
           <a:p>
-            <a:pPr>
-              <a:buNone/>
-            </a:pPr>
             <a:r>
-              <a:rPr lang="en" dirty="0" smtClean="0"/>
-              <a:t>Conclution</a:t>
+              <a:rPr lang="en-US" dirty="0"/>
+              <a:t>Conclusion</a:t>
             </a:r>
             <a:endParaRPr lang="en" dirty="0"/>
           </a:p>
@@ -29426,6 +29423,38 @@
           </a:bodyPr>
           <a:lstStyle/>
           <a:p>
+            <a:r>
+              <a:rPr lang="en-US" dirty="0" smtClean="0"/>
+              <a:t>In Conclusion:</a:t>
+            </a:r>
+          </a:p>
+          <a:p>
+            <a:pPr lvl="1"/>
+            <a:r>
+              <a:rPr lang="en-US" dirty="0" smtClean="0"/>
+              <a:t>Design meets Course specs</a:t>
+            </a:r>
+          </a:p>
+          <a:p>
+            <a:pPr lvl="1"/>
+            <a:r>
+              <a:rPr lang="en-US" dirty="0" smtClean="0"/>
+              <a:t>Design meets Client specs</a:t>
+            </a:r>
+          </a:p>
+          <a:p>
+            <a:pPr lvl="1"/>
+            <a:r>
+              <a:rPr lang="en-US" dirty="0" smtClean="0"/>
+              <a:t>Design is constructible within timeframe</a:t>
+            </a:r>
+          </a:p>
+          <a:p>
+            <a:pPr lvl="1"/>
+            <a:r>
+              <a:rPr lang="en-US" dirty="0" smtClean="0"/>
+              <a:t>Design is within budget</a:t>
+            </a:r>
             <a:endParaRPr dirty="0"/>
           </a:p>
         </p:txBody>
@@ -30138,7 +30167,7 @@
           <p:nvPr>
             <p:extLst>
               <p:ext uri="{D42A27DB-BD31-4B8C-83A1-F6EECF244321}">
-                <p14:modId xmlns:p14="http://schemas.microsoft.com/office/powerpoint/2010/main" val="1045169767"/>
+                <p14:modId xmlns:p14="http://schemas.microsoft.com/office/powerpoint/2010/main" val="601668446"/>
               </p:ext>
             </p:extLst>
           </p:nvPr>
@@ -30154,8 +30183,8 @@
                 <a:noFill/>
               </a:tblPr>
               <a:tblGrid>
-                <a:gridCol w="3619500"/>
-                <a:gridCol w="3619500"/>
+                <a:gridCol w="3543300"/>
+                <a:gridCol w="3695700"/>
               </a:tblGrid>
               <a:tr h="609560">
                 <a:tc>
@@ -30201,9 +30230,10 @@
                         <a:buNone/>
                       </a:pPr>
                       <a:r>
-                        <a:rPr lang="en" sz="2400" dirty="0"/>
-                        <a:t>Client</a:t>
-                      </a:r>
+                        <a:rPr lang="en" sz="2400" dirty="0" smtClean="0"/>
+                        <a:t>Clients</a:t>
+                      </a:r>
+                      <a:endParaRPr lang="en" sz="2400" dirty="0"/>
                     </a:p>
                   </a:txBody>
                   <a:tcPr marL="91425" marR="91425" marT="121900" marB="121900"/>
@@ -30950,19 +30980,34 @@
           </a:p>
           <a:p>
             <a:r>
-              <a:rPr lang="en-US" smtClean="0"/>
-              <a:t>3” LED </a:t>
-            </a:r>
-            <a:r>
               <a:rPr lang="en-US" dirty="0" smtClean="0"/>
-              <a:t>7 segment display for load</a:t>
+              <a:t>3” LED 7 segment display for load</a:t>
             </a:r>
           </a:p>
           <a:p>
             <a:r>
               <a:rPr lang="en-US" dirty="0" smtClean="0"/>
-              <a:t>Raspberry Pi as controller</a:t>
+              <a:t>Raspberry Pi as </a:t>
             </a:r>
+            <a:r>
+              <a:rPr lang="en-US" dirty="0" smtClean="0"/>
+              <a:t>controller</a:t>
+            </a:r>
+          </a:p>
+          <a:p>
+            <a:pPr lvl="1"/>
+            <a:r>
+              <a:rPr lang="en-US" dirty="0" smtClean="0"/>
+              <a:t>Power of a computer</a:t>
+            </a:r>
+          </a:p>
+          <a:p>
+            <a:pPr lvl="1"/>
+            <a:r>
+              <a:rPr lang="en-US" dirty="0" smtClean="0"/>
+              <a:t>Individually controlled pins like a microcontroller</a:t>
+            </a:r>
+            <a:endParaRPr lang="en-US" dirty="0" smtClean="0"/>
           </a:p>
           <a:p>
             <a:pPr lvl="1"/>
@@ -31423,24 +31468,24 @@
           </a:fontRef>
         </p:style>
         <p:txBody>
-          <a:bodyPr rtlCol="0" anchor="b"/>
+          <a:bodyPr rtlCol="0" anchor="t"/>
           <a:lstStyle/>
           <a:p>
             <a:pPr algn="ctr"/>
             <a:r>
-              <a:rPr lang="en-US" sz="6000" dirty="0" smtClean="0">
+              <a:rPr lang="en-US" sz="4800" dirty="0" smtClean="0">
                 <a:solidFill>
                   <a:srgbClr val="FF0000"/>
                 </a:solidFill>
-                <a:latin typeface="Razer Header Light" pitchFamily="2" charset="0"/>
+                <a:latin typeface="NI7SEG" pitchFamily="2" charset="0"/>
               </a:rPr>
               <a:t>8888</a:t>
             </a:r>
-            <a:endParaRPr lang="en-US" sz="6000" dirty="0">
+            <a:endParaRPr lang="en-US" sz="4800" dirty="0">
               <a:solidFill>
                 <a:srgbClr val="FF0000"/>
               </a:solidFill>
-              <a:latin typeface="Razer Header Light" pitchFamily="2" charset="0"/>
+              <a:latin typeface="NI7SEG" pitchFamily="2" charset="0"/>
             </a:endParaRPr>
           </a:p>
         </p:txBody>

</xml_diff>

<commit_message>
Added the notes to the presentation
</commit_message>
<xml_diff>
--- a/Presentations/December 9, 2013/final presentation.pptx
+++ b/Presentations/December 9, 2013/final presentation.pptx
@@ -701,9 +701,486 @@
               <a:buNone/>
             </a:pPr>
             <a:r>
-              <a:rPr lang="en"/>
+              <a:rPr lang="en" dirty="0" smtClean="0"/>
               <a:t>General introduction type stuff.</a:t>
             </a:r>
+            <a:endParaRPr lang="en" dirty="0"/>
+          </a:p>
+        </p:txBody>
+      </p:sp>
+    </p:spTree>
+  </p:cSld>
+  <p:clrMapOvr>
+    <a:masterClrMapping/>
+  </p:clrMapOvr>
+</p:notes>
+</file>
+
+<file path=ppt/notesSlides/notesSlide10.xml><?xml version="1.0" encoding="utf-8"?>
+<p:notes xmlns:a="http://schemas.openxmlformats.org/drawingml/2006/main" xmlns:r="http://schemas.openxmlformats.org/officeDocument/2006/relationships" xmlns:p="http://schemas.openxmlformats.org/presentationml/2006/main" showMasterSp="0" showMasterPhAnim="0">
+  <p:cSld>
+    <p:spTree>
+      <p:nvGrpSpPr>
+        <p:cNvPr id="1" name="Shape 74"/>
+        <p:cNvGrpSpPr/>
+        <p:nvPr/>
+      </p:nvGrpSpPr>
+      <p:grpSpPr>
+        <a:xfrm>
+          <a:off x="0" y="0"/>
+          <a:ext cx="0" cy="0"/>
+          <a:chOff x="0" y="0"/>
+          <a:chExt cx="0" cy="0"/>
+        </a:xfrm>
+      </p:grpSpPr>
+      <p:sp>
+        <p:nvSpPr>
+          <p:cNvPr id="75" name="Shape 75"/>
+          <p:cNvSpPr>
+            <a:spLocks noGrp="1" noRot="1" noChangeAspect="1"/>
+          </p:cNvSpPr>
+          <p:nvPr>
+            <p:ph type="sldImg" idx="2"/>
+          </p:nvPr>
+        </p:nvSpPr>
+        <p:spPr>
+          <a:xfrm>
+            <a:off x="1143000" y="685800"/>
+            <a:ext cx="4572000" cy="3429000"/>
+          </a:xfrm>
+          <a:custGeom>
+            <a:avLst/>
+            <a:gdLst/>
+            <a:ahLst/>
+            <a:cxnLst/>
+            <a:rect l="0" t="0" r="0" b="0"/>
+            <a:pathLst>
+              <a:path w="120000" h="120000" extrusionOk="0">
+                <a:moveTo>
+                  <a:pt x="0" y="0"/>
+                </a:moveTo>
+                <a:lnTo>
+                  <a:pt x="120000" y="0"/>
+                </a:lnTo>
+                <a:lnTo>
+                  <a:pt x="120000" y="120000"/>
+                </a:lnTo>
+                <a:lnTo>
+                  <a:pt x="0" y="120000"/>
+                </a:lnTo>
+                <a:close/>
+              </a:path>
+            </a:pathLst>
+          </a:custGeom>
+        </p:spPr>
+      </p:sp>
+      <p:sp>
+        <p:nvSpPr>
+          <p:cNvPr id="76" name="Shape 76"/>
+          <p:cNvSpPr txBox="1">
+            <a:spLocks noGrp="1"/>
+          </p:cNvSpPr>
+          <p:nvPr>
+            <p:ph type="body" idx="1"/>
+          </p:nvPr>
+        </p:nvSpPr>
+        <p:spPr>
+          <a:xfrm>
+            <a:off x="685800" y="4343400"/>
+            <a:ext cx="5486399" cy="4114800"/>
+          </a:xfrm>
+          <a:prstGeom prst="rect">
+            <a:avLst/>
+          </a:prstGeom>
+        </p:spPr>
+        <p:txBody>
+          <a:bodyPr lIns="91425" tIns="91425" rIns="91425" bIns="91425" anchor="t" anchorCtr="0">
+            <a:noAutofit/>
+          </a:bodyPr>
+          <a:lstStyle/>
+          <a:p>
+            <a:r>
+              <a:rPr lang="en-US" sz="1200" b="0" i="0" u="none" strike="noStrike" kern="1200" dirty="0" smtClean="0">
+                <a:solidFill>
+                  <a:schemeClr val="tx1"/>
+                </a:solidFill>
+                <a:effectLst/>
+                <a:latin typeface="+mn-lt"/>
+                <a:ea typeface="+mn-ea"/>
+                <a:cs typeface="+mn-cs"/>
+              </a:rPr>
+              <a:t>Our rough timeline is only for general reference at this point. Things will almost certainly be done earlier or later than specified when planned this far ahead of time. Our schedule has us ordering parts the first week of the semester. Things will be assembled and programmed in the following weeks. As the deadline approaches the project will be assembled together and calibrated.</a:t>
+            </a:r>
+            <a:endParaRPr dirty="0"/>
+          </a:p>
+        </p:txBody>
+      </p:sp>
+    </p:spTree>
+  </p:cSld>
+  <p:clrMapOvr>
+    <a:masterClrMapping/>
+  </p:clrMapOvr>
+</p:notes>
+</file>
+
+<file path=ppt/notesSlides/notesSlide11.xml><?xml version="1.0" encoding="utf-8"?>
+<p:notes xmlns:a="http://schemas.openxmlformats.org/drawingml/2006/main" xmlns:r="http://schemas.openxmlformats.org/officeDocument/2006/relationships" xmlns:p="http://schemas.openxmlformats.org/presentationml/2006/main" showMasterSp="0" showMasterPhAnim="0">
+  <p:cSld>
+    <p:spTree>
+      <p:nvGrpSpPr>
+        <p:cNvPr id="1" name="Shape 80"/>
+        <p:cNvGrpSpPr/>
+        <p:nvPr/>
+      </p:nvGrpSpPr>
+      <p:grpSpPr>
+        <a:xfrm>
+          <a:off x="0" y="0"/>
+          <a:ext cx="0" cy="0"/>
+          <a:chOff x="0" y="0"/>
+          <a:chExt cx="0" cy="0"/>
+        </a:xfrm>
+      </p:grpSpPr>
+      <p:sp>
+        <p:nvSpPr>
+          <p:cNvPr id="81" name="Shape 81"/>
+          <p:cNvSpPr>
+            <a:spLocks noGrp="1" noRot="1" noChangeAspect="1"/>
+          </p:cNvSpPr>
+          <p:nvPr>
+            <p:ph type="sldImg" idx="2"/>
+          </p:nvPr>
+        </p:nvSpPr>
+        <p:spPr>
+          <a:xfrm>
+            <a:off x="1143000" y="685800"/>
+            <a:ext cx="4572000" cy="3429000"/>
+          </a:xfrm>
+          <a:custGeom>
+            <a:avLst/>
+            <a:gdLst/>
+            <a:ahLst/>
+            <a:cxnLst/>
+            <a:rect l="0" t="0" r="0" b="0"/>
+            <a:pathLst>
+              <a:path w="120000" h="120000" extrusionOk="0">
+                <a:moveTo>
+                  <a:pt x="0" y="0"/>
+                </a:moveTo>
+                <a:lnTo>
+                  <a:pt x="120000" y="0"/>
+                </a:lnTo>
+                <a:lnTo>
+                  <a:pt x="120000" y="120000"/>
+                </a:lnTo>
+                <a:lnTo>
+                  <a:pt x="0" y="120000"/>
+                </a:lnTo>
+                <a:close/>
+              </a:path>
+            </a:pathLst>
+          </a:custGeom>
+        </p:spPr>
+      </p:sp>
+      <p:sp>
+        <p:nvSpPr>
+          <p:cNvPr id="82" name="Shape 82"/>
+          <p:cNvSpPr txBox="1">
+            <a:spLocks noGrp="1"/>
+          </p:cNvSpPr>
+          <p:nvPr>
+            <p:ph type="body" idx="1"/>
+          </p:nvPr>
+        </p:nvSpPr>
+        <p:spPr>
+          <a:xfrm>
+            <a:off x="685800" y="4343400"/>
+            <a:ext cx="5486399" cy="4114800"/>
+          </a:xfrm>
+          <a:prstGeom prst="rect">
+            <a:avLst/>
+          </a:prstGeom>
+        </p:spPr>
+        <p:txBody>
+          <a:bodyPr lIns="91425" tIns="91425" rIns="91425" bIns="91425" anchor="t" anchorCtr="0">
+            <a:noAutofit/>
+          </a:bodyPr>
+          <a:lstStyle/>
+          <a:p>
+            <a:r>
+              <a:rPr lang="en-US" sz="1200" b="0" i="0" u="none" strike="noStrike" kern="1200" dirty="0" smtClean="0">
+                <a:solidFill>
+                  <a:schemeClr val="tx1"/>
+                </a:solidFill>
+                <a:effectLst/>
+                <a:latin typeface="+mn-lt"/>
+                <a:ea typeface="+mn-ea"/>
+                <a:cs typeface="+mn-cs"/>
+              </a:rPr>
+              <a:t>We were given a budget of around $7000. At this point in time we have done some general </a:t>
+            </a:r>
+            <a:r>
+              <a:rPr lang="en-US" sz="1200" b="0" i="0" u="none" strike="noStrike" kern="1200" dirty="0" err="1" smtClean="0">
+                <a:solidFill>
+                  <a:schemeClr val="tx1"/>
+                </a:solidFill>
+                <a:effectLst/>
+                <a:latin typeface="+mn-lt"/>
+                <a:ea typeface="+mn-ea"/>
+                <a:cs typeface="+mn-cs"/>
+              </a:rPr>
+              <a:t>speccing</a:t>
+            </a:r>
+            <a:r>
+              <a:rPr lang="en-US" sz="1200" b="0" i="0" u="none" strike="noStrike" kern="1200" dirty="0" smtClean="0">
+                <a:solidFill>
+                  <a:schemeClr val="tx1"/>
+                </a:solidFill>
+                <a:effectLst/>
+                <a:latin typeface="+mn-lt"/>
+                <a:ea typeface="+mn-ea"/>
+                <a:cs typeface="+mn-cs"/>
+              </a:rPr>
+              <a:t> and estimated some costs for unexpected and unspecified bits of hardware. At the moment our electronics total comes up to around $400, the hydraulics to about $1000, the mechanical to around $350, and the raw materials to around $500. This brings our total to just under $2300 which is significantly under budget. We are sure there will be unexpected costs to increase the total project costs but we will still come in quite a bit under budget.</a:t>
+            </a:r>
+            <a:endParaRPr dirty="0"/>
+          </a:p>
+        </p:txBody>
+      </p:sp>
+    </p:spTree>
+  </p:cSld>
+  <p:clrMapOvr>
+    <a:masterClrMapping/>
+  </p:clrMapOvr>
+</p:notes>
+</file>
+
+<file path=ppt/notesSlides/notesSlide12.xml><?xml version="1.0" encoding="utf-8"?>
+<p:notes xmlns:a="http://schemas.openxmlformats.org/drawingml/2006/main" xmlns:r="http://schemas.openxmlformats.org/officeDocument/2006/relationships" xmlns:p="http://schemas.openxmlformats.org/presentationml/2006/main" showMasterSp="0" showMasterPhAnim="0">
+  <p:cSld>
+    <p:spTree>
+      <p:nvGrpSpPr>
+        <p:cNvPr id="1" name="Shape 80"/>
+        <p:cNvGrpSpPr/>
+        <p:nvPr/>
+      </p:nvGrpSpPr>
+      <p:grpSpPr>
+        <a:xfrm>
+          <a:off x="0" y="0"/>
+          <a:ext cx="0" cy="0"/>
+          <a:chOff x="0" y="0"/>
+          <a:chExt cx="0" cy="0"/>
+        </a:xfrm>
+      </p:grpSpPr>
+      <p:sp>
+        <p:nvSpPr>
+          <p:cNvPr id="81" name="Shape 81"/>
+          <p:cNvSpPr>
+            <a:spLocks noGrp="1" noRot="1" noChangeAspect="1"/>
+          </p:cNvSpPr>
+          <p:nvPr>
+            <p:ph type="sldImg" idx="2"/>
+          </p:nvPr>
+        </p:nvSpPr>
+        <p:spPr>
+          <a:xfrm>
+            <a:off x="1143000" y="685800"/>
+            <a:ext cx="4572000" cy="3429000"/>
+          </a:xfrm>
+          <a:custGeom>
+            <a:avLst/>
+            <a:gdLst/>
+            <a:ahLst/>
+            <a:cxnLst/>
+            <a:rect l="0" t="0" r="0" b="0"/>
+            <a:pathLst>
+              <a:path w="120000" h="120000" extrusionOk="0">
+                <a:moveTo>
+                  <a:pt x="0" y="0"/>
+                </a:moveTo>
+                <a:lnTo>
+                  <a:pt x="120000" y="0"/>
+                </a:lnTo>
+                <a:lnTo>
+                  <a:pt x="120000" y="120000"/>
+                </a:lnTo>
+                <a:lnTo>
+                  <a:pt x="0" y="120000"/>
+                </a:lnTo>
+                <a:close/>
+              </a:path>
+            </a:pathLst>
+          </a:custGeom>
+        </p:spPr>
+      </p:sp>
+      <p:sp>
+        <p:nvSpPr>
+          <p:cNvPr id="82" name="Shape 82"/>
+          <p:cNvSpPr txBox="1">
+            <a:spLocks noGrp="1"/>
+          </p:cNvSpPr>
+          <p:nvPr>
+            <p:ph type="body" idx="1"/>
+          </p:nvPr>
+        </p:nvSpPr>
+        <p:spPr>
+          <a:xfrm>
+            <a:off x="685800" y="4343400"/>
+            <a:ext cx="5486399" cy="4114800"/>
+          </a:xfrm>
+          <a:prstGeom prst="rect">
+            <a:avLst/>
+          </a:prstGeom>
+        </p:spPr>
+        <p:txBody>
+          <a:bodyPr lIns="91425" tIns="91425" rIns="91425" bIns="91425" anchor="t" anchorCtr="0">
+            <a:noAutofit/>
+          </a:bodyPr>
+          <a:lstStyle/>
+          <a:p>
+            <a:r>
+              <a:rPr lang="en-US" sz="1200" b="0" i="0" u="none" strike="noStrike" kern="1200" dirty="0" smtClean="0">
+                <a:solidFill>
+                  <a:schemeClr val="tx1"/>
+                </a:solidFill>
+                <a:effectLst/>
+                <a:latin typeface="+mn-lt"/>
+                <a:ea typeface="+mn-ea"/>
+                <a:cs typeface="+mn-cs"/>
+              </a:rPr>
+              <a:t>Our project fulfills all of the requirements for the class. It has the required amount of mechanical, electrical, and software specifications. Our design fulfills the specifications of Mr. </a:t>
+            </a:r>
+            <a:r>
+              <a:rPr lang="en-US" sz="1200" b="0" i="0" u="none" strike="noStrike" kern="1200" dirty="0" err="1" smtClean="0">
+                <a:solidFill>
+                  <a:schemeClr val="tx1"/>
+                </a:solidFill>
+                <a:effectLst/>
+                <a:latin typeface="+mn-lt"/>
+                <a:ea typeface="+mn-ea"/>
+                <a:cs typeface="+mn-cs"/>
+              </a:rPr>
+              <a:t>Diebolds</a:t>
+            </a:r>
+            <a:r>
+              <a:rPr lang="en-US" sz="1200" b="0" i="0" u="none" strike="noStrike" kern="1200" dirty="0" smtClean="0">
+                <a:solidFill>
+                  <a:schemeClr val="tx1"/>
+                </a:solidFill>
+                <a:effectLst/>
+                <a:latin typeface="+mn-lt"/>
+                <a:ea typeface="+mn-ea"/>
+                <a:cs typeface="+mn-cs"/>
+              </a:rPr>
+              <a:t> the client. </a:t>
+            </a:r>
+            <a:r>
+              <a:rPr lang="en-US" sz="1200" b="0" i="0" u="none" strike="noStrike" kern="1200" smtClean="0">
+                <a:solidFill>
+                  <a:schemeClr val="tx1"/>
+                </a:solidFill>
+                <a:effectLst/>
+                <a:latin typeface="+mn-lt"/>
+                <a:ea typeface="+mn-ea"/>
+                <a:cs typeface="+mn-cs"/>
+              </a:rPr>
+              <a:t>Our project will be able to be constructed in a timely fashion and will fall within our budget constraints.</a:t>
+            </a:r>
+            <a:endParaRPr/>
+          </a:p>
+        </p:txBody>
+      </p:sp>
+    </p:spTree>
+  </p:cSld>
+  <p:clrMapOvr>
+    <a:masterClrMapping/>
+  </p:clrMapOvr>
+</p:notes>
+</file>
+
+<file path=ppt/notesSlides/notesSlide13.xml><?xml version="1.0" encoding="utf-8"?>
+<p:notes xmlns:a="http://schemas.openxmlformats.org/drawingml/2006/main" xmlns:r="http://schemas.openxmlformats.org/officeDocument/2006/relationships" xmlns:p="http://schemas.openxmlformats.org/presentationml/2006/main" showMasterSp="0" showMasterPhAnim="0">
+  <p:cSld>
+    <p:spTree>
+      <p:nvGrpSpPr>
+        <p:cNvPr id="1" name="Shape 80"/>
+        <p:cNvGrpSpPr/>
+        <p:nvPr/>
+      </p:nvGrpSpPr>
+      <p:grpSpPr>
+        <a:xfrm>
+          <a:off x="0" y="0"/>
+          <a:ext cx="0" cy="0"/>
+          <a:chOff x="0" y="0"/>
+          <a:chExt cx="0" cy="0"/>
+        </a:xfrm>
+      </p:grpSpPr>
+      <p:sp>
+        <p:nvSpPr>
+          <p:cNvPr id="81" name="Shape 81"/>
+          <p:cNvSpPr>
+            <a:spLocks noGrp="1" noRot="1" noChangeAspect="1"/>
+          </p:cNvSpPr>
+          <p:nvPr>
+            <p:ph type="sldImg" idx="2"/>
+          </p:nvPr>
+        </p:nvSpPr>
+        <p:spPr>
+          <a:xfrm>
+            <a:off x="1143000" y="685800"/>
+            <a:ext cx="4572000" cy="3429000"/>
+          </a:xfrm>
+          <a:custGeom>
+            <a:avLst/>
+            <a:gdLst/>
+            <a:ahLst/>
+            <a:cxnLst/>
+            <a:rect l="0" t="0" r="0" b="0"/>
+            <a:pathLst>
+              <a:path w="120000" h="120000" extrusionOk="0">
+                <a:moveTo>
+                  <a:pt x="0" y="0"/>
+                </a:moveTo>
+                <a:lnTo>
+                  <a:pt x="120000" y="0"/>
+                </a:lnTo>
+                <a:lnTo>
+                  <a:pt x="120000" y="120000"/>
+                </a:lnTo>
+                <a:lnTo>
+                  <a:pt x="0" y="120000"/>
+                </a:lnTo>
+                <a:close/>
+              </a:path>
+            </a:pathLst>
+          </a:custGeom>
+        </p:spPr>
+      </p:sp>
+      <p:sp>
+        <p:nvSpPr>
+          <p:cNvPr id="82" name="Shape 82"/>
+          <p:cNvSpPr txBox="1">
+            <a:spLocks noGrp="1"/>
+          </p:cNvSpPr>
+          <p:nvPr>
+            <p:ph type="body" idx="1"/>
+          </p:nvPr>
+        </p:nvSpPr>
+        <p:spPr>
+          <a:xfrm>
+            <a:off x="685800" y="4343400"/>
+            <a:ext cx="5486399" cy="4114800"/>
+          </a:xfrm>
+          <a:prstGeom prst="rect">
+            <a:avLst/>
+          </a:prstGeom>
+        </p:spPr>
+        <p:txBody>
+          <a:bodyPr lIns="91425" tIns="91425" rIns="91425" bIns="91425" anchor="t" anchorCtr="0">
+            <a:noAutofit/>
+          </a:bodyPr>
+          <a:lstStyle/>
+          <a:p>
+            <a:endParaRPr/>
           </a:p>
         </p:txBody>
       </p:sp>
@@ -798,7 +1275,19 @@
           </a:bodyPr>
           <a:lstStyle/>
           <a:p>
-            <a:endParaRPr/>
+            <a:r>
+              <a:rPr lang="en-US" sz="1200" b="0" i="0" u="none" strike="noStrike" kern="1200" dirty="0" smtClean="0">
+                <a:solidFill>
+                  <a:schemeClr val="tx1"/>
+                </a:solidFill>
+                <a:effectLst/>
+                <a:latin typeface="+mn-lt"/>
+                <a:ea typeface="+mn-ea"/>
+                <a:cs typeface="+mn-cs"/>
+              </a:rPr>
+              <a:t>We will discuss the background of our project and the course goals. We will also go over our solution to the selected project and show our system diagram. Areas of responsibility will be reviewed as well as a preliminary timeline and rough budget.</a:t>
+            </a:r>
+            <a:endParaRPr dirty="0"/>
           </a:p>
         </p:txBody>
       </p:sp>
@@ -897,21 +1386,18 @@
               <a:buNone/>
             </a:pPr>
             <a:r>
-              <a:rPr lang="en"/>
-              <a:t>The course that we are part </a:t>
+              <a:rPr lang="en-US" sz="1200" b="0" i="0" u="none" strike="noStrike" kern="1200" dirty="0" smtClean="0">
+                <a:solidFill>
+                  <a:schemeClr val="tx1"/>
+                </a:solidFill>
+                <a:effectLst/>
+                <a:latin typeface="+mn-lt"/>
+                <a:ea typeface="+mn-ea"/>
+                <a:cs typeface="+mn-cs"/>
+              </a:rPr>
+              <a:t>This course is a year long course spread over the two senior semesters. We were tasked with picking a project from a list. For our projects we must communicate with our clients and create a design that fulfills the design requirements. As the project progresses and matures, meetings with the clients will continue to show progress and address concerns. The design will be revised to reflect the changes that the client requests. At the end of April the projects will be demonstrated and presented.</a:t>
             </a:r>
-          </a:p>
-          <a:p>
-            <a:endParaRPr lang="en"/>
-          </a:p>
-          <a:p>
-            <a:pPr>
-              <a:buNone/>
-            </a:pPr>
-            <a:r>
-              <a:rPr lang="en"/>
-              <a:t>Let me tell you a little bit about the </a:t>
-            </a:r>
+            <a:endParaRPr lang="en" dirty="0"/>
           </a:p>
         </p:txBody>
       </p:sp>
@@ -1006,7 +1492,43 @@
           </a:bodyPr>
           <a:lstStyle/>
           <a:p>
-            <a:endParaRPr/>
+            <a:r>
+              <a:rPr lang="en-US" sz="1200" b="0" i="0" u="none" strike="noStrike" kern="1200" dirty="0" smtClean="0">
+                <a:solidFill>
+                  <a:schemeClr val="tx1"/>
+                </a:solidFill>
+                <a:effectLst/>
+                <a:latin typeface="+mn-lt"/>
+                <a:ea typeface="+mn-ea"/>
+                <a:cs typeface="+mn-cs"/>
+              </a:rPr>
+              <a:t>Our project is to build a bridge tester that is compatible with the </a:t>
+            </a:r>
+            <a:r>
+              <a:rPr lang="en-US" sz="1200" b="0" i="0" u="none" strike="noStrike" kern="1200" dirty="0" err="1" smtClean="0">
+                <a:solidFill>
+                  <a:schemeClr val="tx1"/>
+                </a:solidFill>
+                <a:effectLst/>
+                <a:latin typeface="+mn-lt"/>
+                <a:ea typeface="+mn-ea"/>
+                <a:cs typeface="+mn-cs"/>
+              </a:rPr>
+              <a:t>Troitski</a:t>
+            </a:r>
+            <a:r>
+              <a:rPr lang="en-US" sz="1200" b="0" i="0" u="none" strike="noStrike" kern="1200" dirty="0" smtClean="0">
+                <a:solidFill>
+                  <a:schemeClr val="tx1"/>
+                </a:solidFill>
+                <a:effectLst/>
+                <a:latin typeface="+mn-lt"/>
+                <a:ea typeface="+mn-ea"/>
+                <a:cs typeface="+mn-cs"/>
+              </a:rPr>
+              <a:t> Bridge Competition in April. Our clients are John Diebold and Gordon Reynolds who are both Architecture professors at VTC. We were given a design budget of around $7000 to work with. We added an extra specification to our project that it should be open source so other schools can make their own based on our design.</a:t>
+            </a:r>
+            <a:endParaRPr dirty="0"/>
           </a:p>
         </p:txBody>
       </p:sp>
@@ -1019,6 +1541,709 @@
 </file>
 
 <file path=ppt/notesSlides/notesSlide5.xml><?xml version="1.0" encoding="utf-8"?>
+<p:notes xmlns:a="http://schemas.openxmlformats.org/drawingml/2006/main" xmlns:r="http://schemas.openxmlformats.org/officeDocument/2006/relationships" xmlns:p="http://schemas.openxmlformats.org/presentationml/2006/main">
+  <p:cSld>
+    <p:spTree>
+      <p:nvGrpSpPr>
+        <p:cNvPr id="1" name=""/>
+        <p:cNvGrpSpPr/>
+        <p:nvPr/>
+      </p:nvGrpSpPr>
+      <p:grpSpPr>
+        <a:xfrm>
+          <a:off x="0" y="0"/>
+          <a:ext cx="0" cy="0"/>
+          <a:chOff x="0" y="0"/>
+          <a:chExt cx="0" cy="0"/>
+        </a:xfrm>
+      </p:grpSpPr>
+      <p:sp>
+        <p:nvSpPr>
+          <p:cNvPr id="2" name="Slide Image Placeholder 1"/>
+          <p:cNvSpPr>
+            <a:spLocks noGrp="1" noRot="1" noChangeAspect="1"/>
+          </p:cNvSpPr>
+          <p:nvPr>
+            <p:ph type="sldImg"/>
+          </p:nvPr>
+        </p:nvSpPr>
+        <p:spPr/>
+      </p:sp>
+      <p:sp>
+        <p:nvSpPr>
+          <p:cNvPr id="3" name="Notes Placeholder 2"/>
+          <p:cNvSpPr>
+            <a:spLocks noGrp="1"/>
+          </p:cNvSpPr>
+          <p:nvPr>
+            <p:ph type="body" idx="1"/>
+          </p:nvPr>
+        </p:nvSpPr>
+        <p:spPr/>
+        <p:txBody>
+          <a:bodyPr/>
+          <a:lstStyle/>
+          <a:p>
+            <a:pPr rtl="0"/>
+            <a:r>
+              <a:rPr lang="en-US" sz="1200" b="0" i="0" u="none" strike="noStrike" kern="1200" dirty="0" smtClean="0">
+                <a:solidFill>
+                  <a:schemeClr val="tx1"/>
+                </a:solidFill>
+                <a:effectLst/>
+                <a:latin typeface="+mn-lt"/>
+                <a:ea typeface="+mn-ea"/>
+                <a:cs typeface="+mn-cs"/>
+              </a:rPr>
+              <a:t>We are basing our design off the tester used at the </a:t>
+            </a:r>
+            <a:r>
+              <a:rPr lang="en-US" sz="1200" b="0" i="0" u="none" strike="noStrike" kern="1200" dirty="0" err="1" smtClean="0">
+                <a:solidFill>
+                  <a:schemeClr val="tx1"/>
+                </a:solidFill>
+                <a:effectLst/>
+                <a:latin typeface="+mn-lt"/>
+                <a:ea typeface="+mn-ea"/>
+                <a:cs typeface="+mn-cs"/>
+              </a:rPr>
+              <a:t>Troitski</a:t>
+            </a:r>
+            <a:r>
+              <a:rPr lang="en-US" sz="1200" b="0" i="0" u="none" strike="noStrike" kern="1200" dirty="0" smtClean="0">
+                <a:solidFill>
+                  <a:schemeClr val="tx1"/>
+                </a:solidFill>
+                <a:effectLst/>
+                <a:latin typeface="+mn-lt"/>
+                <a:ea typeface="+mn-ea"/>
+                <a:cs typeface="+mn-cs"/>
+              </a:rPr>
+              <a:t> competition in Montreal. We hope to make a tester that will allow the students here at VTC to practice by testing bridges here before going up to Montreal. We also hope that by making the tester available here at VTC, we can hold competitions for the local high schools and potentially colleges in the region.</a:t>
+            </a:r>
+            <a:endParaRPr lang="en-US" b="0" dirty="0" smtClean="0">
+              <a:effectLst/>
+            </a:endParaRPr>
+          </a:p>
+          <a:p>
+            <a:pPr rtl="0"/>
+            <a:r>
+              <a:rPr lang="en-US" sz="1200" b="0" i="0" u="none" strike="noStrike" kern="1200" dirty="0" smtClean="0">
+                <a:solidFill>
+                  <a:schemeClr val="tx1"/>
+                </a:solidFill>
+                <a:effectLst/>
+                <a:latin typeface="+mn-lt"/>
+                <a:ea typeface="+mn-ea"/>
+                <a:cs typeface="+mn-cs"/>
+              </a:rPr>
+              <a:t>We have worked out some of the preliminary specs with the architecture professors:</a:t>
+            </a:r>
+            <a:endParaRPr lang="en-US" b="0" dirty="0" smtClean="0">
+              <a:effectLst/>
+            </a:endParaRPr>
+          </a:p>
+          <a:p>
+            <a:pPr rtl="0" fontAlgn="base"/>
+            <a:r>
+              <a:rPr lang="en-US" sz="1200" b="0" i="0" u="none" strike="noStrike" kern="1200" dirty="0" smtClean="0">
+                <a:solidFill>
+                  <a:schemeClr val="tx1"/>
+                </a:solidFill>
+                <a:effectLst/>
+                <a:latin typeface="+mn-lt"/>
+                <a:ea typeface="+mn-ea"/>
+                <a:cs typeface="+mn-cs"/>
+              </a:rPr>
+              <a:t>The tester will have the ability to test a bridge with a 1 meter span. </a:t>
+            </a:r>
+          </a:p>
+          <a:p>
+            <a:pPr rtl="0" fontAlgn="base"/>
+            <a:r>
+              <a:rPr lang="en-US" sz="1200" b="0" i="0" u="none" strike="noStrike" kern="1200" dirty="0" smtClean="0">
+                <a:solidFill>
+                  <a:schemeClr val="tx1"/>
+                </a:solidFill>
+                <a:effectLst/>
+                <a:latin typeface="+mn-lt"/>
+                <a:ea typeface="+mn-ea"/>
+                <a:cs typeface="+mn-cs"/>
+              </a:rPr>
+              <a:t>The current record at the </a:t>
+            </a:r>
+            <a:r>
+              <a:rPr lang="en-US" sz="1200" b="0" i="0" u="none" strike="noStrike" kern="1200" dirty="0" err="1" smtClean="0">
+                <a:solidFill>
+                  <a:schemeClr val="tx1"/>
+                </a:solidFill>
+                <a:effectLst/>
+                <a:latin typeface="+mn-lt"/>
+                <a:ea typeface="+mn-ea"/>
+                <a:cs typeface="+mn-cs"/>
+              </a:rPr>
+              <a:t>Troitski</a:t>
+            </a:r>
+            <a:r>
+              <a:rPr lang="en-US" sz="1200" b="0" i="0" u="none" strike="noStrike" kern="1200" dirty="0" smtClean="0">
+                <a:solidFill>
+                  <a:schemeClr val="tx1"/>
+                </a:solidFill>
+                <a:effectLst/>
+                <a:latin typeface="+mn-lt"/>
+                <a:ea typeface="+mn-ea"/>
+                <a:cs typeface="+mn-cs"/>
+              </a:rPr>
+              <a:t> competition is only 3.2 tons, so we will make our tester strong enough to break a bridge with 5 tons. </a:t>
+            </a:r>
+          </a:p>
+          <a:p>
+            <a:pPr rtl="0" fontAlgn="base"/>
+            <a:r>
+              <a:rPr lang="en-US" sz="1200" b="0" i="0" u="none" strike="noStrike" kern="1200" dirty="0" smtClean="0">
+                <a:solidFill>
+                  <a:schemeClr val="tx1"/>
+                </a:solidFill>
+                <a:effectLst/>
+                <a:latin typeface="+mn-lt"/>
+                <a:ea typeface="+mn-ea"/>
+                <a:cs typeface="+mn-cs"/>
+              </a:rPr>
+              <a:t>One of the things that we noticed while looking at the current </a:t>
+            </a:r>
+            <a:r>
+              <a:rPr lang="en-US" sz="1200" b="0" i="0" u="none" strike="noStrike" kern="1200" dirty="0" err="1" smtClean="0">
+                <a:solidFill>
+                  <a:schemeClr val="tx1"/>
+                </a:solidFill>
+                <a:effectLst/>
+                <a:latin typeface="+mn-lt"/>
+                <a:ea typeface="+mn-ea"/>
+                <a:cs typeface="+mn-cs"/>
+              </a:rPr>
+              <a:t>Troitski</a:t>
+            </a:r>
+            <a:r>
+              <a:rPr lang="en-US" sz="1200" b="0" i="0" u="none" strike="noStrike" kern="1200" dirty="0" smtClean="0">
+                <a:solidFill>
+                  <a:schemeClr val="tx1"/>
+                </a:solidFill>
+                <a:effectLst/>
+                <a:latin typeface="+mn-lt"/>
+                <a:ea typeface="+mn-ea"/>
+                <a:cs typeface="+mn-cs"/>
+              </a:rPr>
+              <a:t> tester is that it is very heavy and hard to move around. We will be designing our tester so it can be moved into Judd gym by two people. This means it needs to be able to be carried down stairs and fit through a single standard door.</a:t>
+            </a:r>
+          </a:p>
+          <a:p>
+            <a:pPr rtl="0" fontAlgn="base"/>
+            <a:r>
+              <a:rPr lang="en-US" sz="1200" b="0" i="0" u="none" strike="noStrike" kern="1200" dirty="0" smtClean="0">
+                <a:solidFill>
+                  <a:schemeClr val="tx1"/>
+                </a:solidFill>
+                <a:effectLst/>
+                <a:latin typeface="+mn-lt"/>
+                <a:ea typeface="+mn-ea"/>
+                <a:cs typeface="+mn-cs"/>
+              </a:rPr>
+              <a:t>We will be trying to make the tester accurate to within 1%. This means that the displayed load will be within 1% of the true force applied to the bridge</a:t>
+            </a:r>
+          </a:p>
+          <a:p>
+            <a:pPr rtl="0" fontAlgn="base"/>
+            <a:r>
+              <a:rPr lang="en-US" sz="1200" b="0" i="0" u="none" strike="noStrike" kern="1200" dirty="0" smtClean="0">
+                <a:solidFill>
+                  <a:schemeClr val="tx1"/>
+                </a:solidFill>
+                <a:effectLst/>
+                <a:latin typeface="+mn-lt"/>
+                <a:ea typeface="+mn-ea"/>
+                <a:cs typeface="+mn-cs"/>
+              </a:rPr>
+              <a:t>We will also try to ensure that the Displayed load will be precise to within 1 </a:t>
+            </a:r>
+            <a:r>
+              <a:rPr lang="en-US" sz="1200" b="0" i="0" u="none" strike="noStrike" kern="1200" dirty="0" err="1" smtClean="0">
+                <a:solidFill>
+                  <a:schemeClr val="tx1"/>
+                </a:solidFill>
+                <a:effectLst/>
+                <a:latin typeface="+mn-lt"/>
+                <a:ea typeface="+mn-ea"/>
+                <a:cs typeface="+mn-cs"/>
+              </a:rPr>
+              <a:t>lb</a:t>
+            </a:r>
+            <a:r>
+              <a:rPr lang="en-US" sz="1200" b="0" i="0" u="none" strike="noStrike" kern="1200" dirty="0" smtClean="0">
+                <a:solidFill>
+                  <a:schemeClr val="tx1"/>
+                </a:solidFill>
+                <a:effectLst/>
+                <a:latin typeface="+mn-lt"/>
+                <a:ea typeface="+mn-ea"/>
+                <a:cs typeface="+mn-cs"/>
+              </a:rPr>
+              <a:t>, the smallest unit we will be measuring, between competitions. This will ensure that a bridge breaking at 501lb really did take more force than the bridge that broke at 500lb earlier that afternoon.</a:t>
+            </a:r>
+          </a:p>
+          <a:p>
+            <a:pPr rtl="0" fontAlgn="base"/>
+            <a:r>
+              <a:rPr lang="en-US" sz="1200" b="0" i="0" u="none" strike="noStrike" kern="1200" dirty="0" smtClean="0">
+                <a:solidFill>
+                  <a:schemeClr val="tx1"/>
+                </a:solidFill>
+                <a:effectLst/>
+                <a:latin typeface="+mn-lt"/>
+                <a:ea typeface="+mn-ea"/>
+                <a:cs typeface="+mn-cs"/>
+              </a:rPr>
+              <a:t>The tester will have a 14” throw enabling the competition to “serve” bridges of different heights</a:t>
+            </a:r>
+          </a:p>
+          <a:p>
+            <a:endParaRPr lang="en-US" dirty="0"/>
+          </a:p>
+        </p:txBody>
+      </p:sp>
+      <p:sp>
+        <p:nvSpPr>
+          <p:cNvPr id="4" name="Slide Number Placeholder 3"/>
+          <p:cNvSpPr>
+            <a:spLocks noGrp="1"/>
+          </p:cNvSpPr>
+          <p:nvPr>
+            <p:ph type="sldNum" sz="quarter" idx="10"/>
+          </p:nvPr>
+        </p:nvSpPr>
+        <p:spPr/>
+        <p:txBody>
+          <a:bodyPr/>
+          <a:lstStyle/>
+          <a:p>
+            <a:fld id="{1E7145D9-3B8E-4505-A6EF-634B668909F9}" type="slidenum">
+              <a:rPr lang="en-US" smtClean="0"/>
+              <a:t>5</a:t>
+            </a:fld>
+            <a:endParaRPr lang="en-US"/>
+          </a:p>
+        </p:txBody>
+      </p:sp>
+    </p:spTree>
+    <p:extLst>
+      <p:ext uri="{BB962C8B-B14F-4D97-AF65-F5344CB8AC3E}">
+        <p14:creationId xmlns:p14="http://schemas.microsoft.com/office/powerpoint/2010/main" val="757088193"/>
+      </p:ext>
+    </p:extLst>
+  </p:cSld>
+  <p:clrMapOvr>
+    <a:masterClrMapping/>
+  </p:clrMapOvr>
+</p:notes>
+</file>
+
+<file path=ppt/notesSlides/notesSlide6.xml><?xml version="1.0" encoding="utf-8"?>
+<p:notes xmlns:a="http://schemas.openxmlformats.org/drawingml/2006/main" xmlns:r="http://schemas.openxmlformats.org/officeDocument/2006/relationships" xmlns:p="http://schemas.openxmlformats.org/presentationml/2006/main">
+  <p:cSld>
+    <p:spTree>
+      <p:nvGrpSpPr>
+        <p:cNvPr id="1" name=""/>
+        <p:cNvGrpSpPr/>
+        <p:nvPr/>
+      </p:nvGrpSpPr>
+      <p:grpSpPr>
+        <a:xfrm>
+          <a:off x="0" y="0"/>
+          <a:ext cx="0" cy="0"/>
+          <a:chOff x="0" y="0"/>
+          <a:chExt cx="0" cy="0"/>
+        </a:xfrm>
+      </p:grpSpPr>
+      <p:sp>
+        <p:nvSpPr>
+          <p:cNvPr id="2" name="Slide Image Placeholder 1"/>
+          <p:cNvSpPr>
+            <a:spLocks noGrp="1" noRot="1" noChangeAspect="1"/>
+          </p:cNvSpPr>
+          <p:nvPr>
+            <p:ph type="sldImg"/>
+          </p:nvPr>
+        </p:nvSpPr>
+        <p:spPr/>
+      </p:sp>
+      <p:sp>
+        <p:nvSpPr>
+          <p:cNvPr id="3" name="Notes Placeholder 2"/>
+          <p:cNvSpPr>
+            <a:spLocks noGrp="1"/>
+          </p:cNvSpPr>
+          <p:nvPr>
+            <p:ph type="body" idx="1"/>
+          </p:nvPr>
+        </p:nvSpPr>
+        <p:spPr/>
+        <p:txBody>
+          <a:bodyPr/>
+          <a:lstStyle/>
+          <a:p>
+            <a:pPr rtl="0"/>
+            <a:r>
+              <a:rPr lang="en-US" sz="1200" b="0" i="0" u="none" strike="noStrike" kern="1200" dirty="0" smtClean="0">
+                <a:solidFill>
+                  <a:schemeClr val="tx1"/>
+                </a:solidFill>
+                <a:effectLst/>
+                <a:latin typeface="+mn-lt"/>
+                <a:ea typeface="+mn-ea"/>
+                <a:cs typeface="+mn-cs"/>
+              </a:rPr>
+              <a:t>In this slide you will see some preliminary calculations to check the viability of the project. I wanted to see how much steel would be needed to hold the kind of forces that we will be seeing in this tester. I picked 1020 cold rolled steel as it is a common steel for framing, and is easily </a:t>
+            </a:r>
+            <a:r>
+              <a:rPr lang="en-US" sz="1200" b="0" i="0" u="none" strike="noStrike" kern="1200" dirty="0" err="1" smtClean="0">
+                <a:solidFill>
+                  <a:schemeClr val="tx1"/>
+                </a:solidFill>
+                <a:effectLst/>
+                <a:latin typeface="+mn-lt"/>
+                <a:ea typeface="+mn-ea"/>
+                <a:cs typeface="+mn-cs"/>
+              </a:rPr>
+              <a:t>weldable</a:t>
+            </a:r>
+            <a:r>
+              <a:rPr lang="en-US" sz="1200" b="0" i="0" u="none" strike="noStrike" kern="1200" dirty="0" smtClean="0">
+                <a:solidFill>
+                  <a:schemeClr val="tx1"/>
+                </a:solidFill>
+                <a:effectLst/>
+                <a:latin typeface="+mn-lt"/>
+                <a:ea typeface="+mn-ea"/>
+                <a:cs typeface="+mn-cs"/>
+              </a:rPr>
+              <a:t>. </a:t>
+            </a:r>
+            <a:endParaRPr lang="en-US" b="0" dirty="0" smtClean="0">
+              <a:effectLst/>
+            </a:endParaRPr>
+          </a:p>
+          <a:p>
+            <a:pPr rtl="0"/>
+            <a:r>
+              <a:rPr lang="en-US" sz="1200" b="0" i="0" u="none" strike="noStrike" kern="1200" dirty="0" smtClean="0">
+                <a:solidFill>
+                  <a:schemeClr val="tx1"/>
+                </a:solidFill>
+                <a:effectLst/>
+                <a:latin typeface="+mn-lt"/>
+                <a:ea typeface="+mn-ea"/>
+                <a:cs typeface="+mn-cs"/>
+              </a:rPr>
+              <a:t>Before I get into the calculations, let me explain a few terms first. The yield strength of a material is the “pressure” that needs to be applied to an area before it permanently deforms. For 1020 cold rolled, this means that a 1” square bar can have 20 tons hung on it without it permanently stretching. </a:t>
+            </a:r>
+            <a:endParaRPr lang="en-US" b="0" dirty="0" smtClean="0">
+              <a:effectLst/>
+            </a:endParaRPr>
+          </a:p>
+          <a:p>
+            <a:pPr rtl="0"/>
+            <a:r>
+              <a:rPr lang="en-US" sz="1200" b="0" i="0" u="none" strike="noStrike" kern="1200" dirty="0" smtClean="0">
+                <a:solidFill>
+                  <a:schemeClr val="tx1"/>
+                </a:solidFill>
+                <a:effectLst/>
+                <a:latin typeface="+mn-lt"/>
+                <a:ea typeface="+mn-ea"/>
+                <a:cs typeface="+mn-cs"/>
+              </a:rPr>
+              <a:t>This means that 2” square tubing with 1/16” walls, which has about .5 square inches of material, can hold about 10 tons. If the wall thickness was expanded to ⅛” then the max load is about 20 tons.</a:t>
+            </a:r>
+            <a:endParaRPr lang="en-US" b="0" dirty="0" smtClean="0">
+              <a:effectLst/>
+            </a:endParaRPr>
+          </a:p>
+          <a:p>
+            <a:pPr rtl="0"/>
+            <a:r>
+              <a:rPr lang="en-US" sz="1200" b="0" i="0" u="none" strike="noStrike" kern="1200" dirty="0" smtClean="0">
+                <a:solidFill>
+                  <a:schemeClr val="tx1"/>
+                </a:solidFill>
+                <a:effectLst/>
+                <a:latin typeface="+mn-lt"/>
+                <a:ea typeface="+mn-ea"/>
+                <a:cs typeface="+mn-cs"/>
+              </a:rPr>
+              <a:t>The other area of concern is the piston size. To calculate the size, I started with the premise that 1000PSI was the max PSI that should be ruin through the hydraulic lines, and that meant that a 5 ton piston would have a diameter of 3.6” </a:t>
+            </a:r>
+            <a:endParaRPr lang="en-US" b="0" dirty="0" smtClean="0">
+              <a:effectLst/>
+            </a:endParaRPr>
+          </a:p>
+          <a:p>
+            <a:pPr rtl="0"/>
+            <a:r>
+              <a:rPr lang="en-US" sz="1200" b="0" i="0" u="none" strike="noStrike" kern="1200" dirty="0" smtClean="0">
+                <a:solidFill>
+                  <a:schemeClr val="tx1"/>
+                </a:solidFill>
+                <a:effectLst/>
+                <a:latin typeface="+mn-lt"/>
+                <a:ea typeface="+mn-ea"/>
+                <a:cs typeface="+mn-cs"/>
+              </a:rPr>
+              <a:t>From these calculations it is clear that it will be possible to build a tester that uses a hydraulic cylinder, and steel tube framing.</a:t>
+            </a:r>
+            <a:endParaRPr lang="en-US" b="0" dirty="0" smtClean="0">
+              <a:effectLst/>
+            </a:endParaRPr>
+          </a:p>
+          <a:p>
+            <a:r>
+              <a:rPr lang="en-US" dirty="0" smtClean="0"/>
+              <a:t/>
+            </a:r>
+            <a:br>
+              <a:rPr lang="en-US" dirty="0" smtClean="0"/>
+            </a:br>
+            <a:endParaRPr lang="en-US" dirty="0"/>
+          </a:p>
+        </p:txBody>
+      </p:sp>
+      <p:sp>
+        <p:nvSpPr>
+          <p:cNvPr id="4" name="Slide Number Placeholder 3"/>
+          <p:cNvSpPr>
+            <a:spLocks noGrp="1"/>
+          </p:cNvSpPr>
+          <p:nvPr>
+            <p:ph type="sldNum" sz="quarter" idx="10"/>
+          </p:nvPr>
+        </p:nvSpPr>
+        <p:spPr/>
+        <p:txBody>
+          <a:bodyPr/>
+          <a:lstStyle/>
+          <a:p>
+            <a:fld id="{1E7145D9-3B8E-4505-A6EF-634B668909F9}" type="slidenum">
+              <a:rPr lang="en-US" smtClean="0"/>
+              <a:t>6</a:t>
+            </a:fld>
+            <a:endParaRPr lang="en-US"/>
+          </a:p>
+        </p:txBody>
+      </p:sp>
+    </p:spTree>
+    <p:extLst>
+      <p:ext uri="{BB962C8B-B14F-4D97-AF65-F5344CB8AC3E}">
+        <p14:creationId xmlns:p14="http://schemas.microsoft.com/office/powerpoint/2010/main" val="2471975554"/>
+      </p:ext>
+    </p:extLst>
+  </p:cSld>
+  <p:clrMapOvr>
+    <a:masterClrMapping/>
+  </p:clrMapOvr>
+</p:notes>
+</file>
+
+<file path=ppt/notesSlides/notesSlide7.xml><?xml version="1.0" encoding="utf-8"?>
+<p:notes xmlns:a="http://schemas.openxmlformats.org/drawingml/2006/main" xmlns:r="http://schemas.openxmlformats.org/officeDocument/2006/relationships" xmlns:p="http://schemas.openxmlformats.org/presentationml/2006/main">
+  <p:cSld>
+    <p:spTree>
+      <p:nvGrpSpPr>
+        <p:cNvPr id="1" name=""/>
+        <p:cNvGrpSpPr/>
+        <p:nvPr/>
+      </p:nvGrpSpPr>
+      <p:grpSpPr>
+        <a:xfrm>
+          <a:off x="0" y="0"/>
+          <a:ext cx="0" cy="0"/>
+          <a:chOff x="0" y="0"/>
+          <a:chExt cx="0" cy="0"/>
+        </a:xfrm>
+      </p:grpSpPr>
+      <p:sp>
+        <p:nvSpPr>
+          <p:cNvPr id="2" name="Slide Image Placeholder 1"/>
+          <p:cNvSpPr>
+            <a:spLocks noGrp="1" noRot="1" noChangeAspect="1"/>
+          </p:cNvSpPr>
+          <p:nvPr>
+            <p:ph type="sldImg"/>
+          </p:nvPr>
+        </p:nvSpPr>
+        <p:spPr/>
+      </p:sp>
+      <p:sp>
+        <p:nvSpPr>
+          <p:cNvPr id="3" name="Notes Placeholder 2"/>
+          <p:cNvSpPr>
+            <a:spLocks noGrp="1"/>
+          </p:cNvSpPr>
+          <p:nvPr>
+            <p:ph type="body" idx="1"/>
+          </p:nvPr>
+        </p:nvSpPr>
+        <p:spPr/>
+        <p:txBody>
+          <a:bodyPr/>
+          <a:lstStyle/>
+          <a:p>
+            <a:r>
+              <a:rPr lang="en-US" sz="1200" b="0" i="0" u="none" strike="noStrike" kern="1200" dirty="0" smtClean="0">
+                <a:solidFill>
+                  <a:schemeClr val="tx1"/>
+                </a:solidFill>
+                <a:effectLst/>
+                <a:latin typeface="+mn-lt"/>
+                <a:ea typeface="+mn-ea"/>
+                <a:cs typeface="+mn-cs"/>
+              </a:rPr>
+              <a:t>Our preliminary design consists of a hydraulic cylinder fixed to the top of a truss frame design. The frame must fit a bridge with a span of a meter within it. The hydraulic cylinder has a stroke of 14” which should allow for plenty of reach. We are using a steel truss design over an I-Beam design in order to save overall weight while maintaining high structural strength and rigidity. A 7-Segment with 3” tall characters will be used to allow the audience to clearly see the current load value from a distance. A Raspberry Pi microcomputer will be used as the main controller for our project. It has the power of a standard computer with the low price and super small size of a microcontroller. An LCD screen with a custom GUI showing deformation in live time will be connected directly to the Raspberry Pi using an HDMI cable. A web interface will also be designed to allow for the downloading of run logs from remote locations.</a:t>
+            </a:r>
+            <a:endParaRPr lang="en-US" dirty="0"/>
+          </a:p>
+        </p:txBody>
+      </p:sp>
+      <p:sp>
+        <p:nvSpPr>
+          <p:cNvPr id="4" name="Slide Number Placeholder 3"/>
+          <p:cNvSpPr>
+            <a:spLocks noGrp="1"/>
+          </p:cNvSpPr>
+          <p:nvPr>
+            <p:ph type="sldNum" sz="quarter" idx="10"/>
+          </p:nvPr>
+        </p:nvSpPr>
+        <p:spPr/>
+        <p:txBody>
+          <a:bodyPr/>
+          <a:lstStyle/>
+          <a:p>
+            <a:fld id="{1E7145D9-3B8E-4505-A6EF-634B668909F9}" type="slidenum">
+              <a:rPr lang="en-US" smtClean="0"/>
+              <a:t>7</a:t>
+            </a:fld>
+            <a:endParaRPr lang="en-US"/>
+          </a:p>
+        </p:txBody>
+      </p:sp>
+    </p:spTree>
+    <p:extLst>
+      <p:ext uri="{BB962C8B-B14F-4D97-AF65-F5344CB8AC3E}">
+        <p14:creationId xmlns:p14="http://schemas.microsoft.com/office/powerpoint/2010/main" val="1186758883"/>
+      </p:ext>
+    </p:extLst>
+  </p:cSld>
+  <p:clrMapOvr>
+    <a:masterClrMapping/>
+  </p:clrMapOvr>
+</p:notes>
+</file>
+
+<file path=ppt/notesSlides/notesSlide8.xml><?xml version="1.0" encoding="utf-8"?>
+<p:notes xmlns:a="http://schemas.openxmlformats.org/drawingml/2006/main" xmlns:r="http://schemas.openxmlformats.org/officeDocument/2006/relationships" xmlns:p="http://schemas.openxmlformats.org/presentationml/2006/main">
+  <p:cSld>
+    <p:spTree>
+      <p:nvGrpSpPr>
+        <p:cNvPr id="1" name=""/>
+        <p:cNvGrpSpPr/>
+        <p:nvPr/>
+      </p:nvGrpSpPr>
+      <p:grpSpPr>
+        <a:xfrm>
+          <a:off x="0" y="0"/>
+          <a:ext cx="0" cy="0"/>
+          <a:chOff x="0" y="0"/>
+          <a:chExt cx="0" cy="0"/>
+        </a:xfrm>
+      </p:grpSpPr>
+      <p:sp>
+        <p:nvSpPr>
+          <p:cNvPr id="2" name="Slide Image Placeholder 1"/>
+          <p:cNvSpPr>
+            <a:spLocks noGrp="1" noRot="1" noChangeAspect="1"/>
+          </p:cNvSpPr>
+          <p:nvPr>
+            <p:ph type="sldImg"/>
+          </p:nvPr>
+        </p:nvSpPr>
+        <p:spPr/>
+      </p:sp>
+      <p:sp>
+        <p:nvSpPr>
+          <p:cNvPr id="3" name="Notes Placeholder 2"/>
+          <p:cNvSpPr>
+            <a:spLocks noGrp="1"/>
+          </p:cNvSpPr>
+          <p:nvPr>
+            <p:ph type="body" idx="1"/>
+          </p:nvPr>
+        </p:nvSpPr>
+        <p:spPr/>
+        <p:txBody>
+          <a:bodyPr/>
+          <a:lstStyle/>
+          <a:p>
+            <a:r>
+              <a:rPr lang="en-US" sz="1200" b="0" i="0" u="none" strike="noStrike" kern="1200" dirty="0" smtClean="0">
+                <a:solidFill>
+                  <a:schemeClr val="tx1"/>
+                </a:solidFill>
+                <a:effectLst/>
+                <a:latin typeface="+mn-lt"/>
+                <a:ea typeface="+mn-ea"/>
+                <a:cs typeface="+mn-cs"/>
+              </a:rPr>
+              <a:t>Our design consists of a steel frame with trusses made from 2in square tubing. This allows for great strength while maintaining relatively low weight. There is a hydraulic cylinder with a large throw of around 14”. The cylinder is pressurized with a large hydraulic pump powered by an electric motor. There is a control box on the side of the frame for the operator to control the tester. There is a Raspberry Pi inside control box that controls 7-Segment display, the LCD screen, hydraulic pump, and reads the pressure gauge using various interface methods all translated over the GPIO pins. The frame is on wheels for easy mobility.</a:t>
+            </a:r>
+            <a:endParaRPr lang="en-US" dirty="0"/>
+          </a:p>
+        </p:txBody>
+      </p:sp>
+      <p:sp>
+        <p:nvSpPr>
+          <p:cNvPr id="4" name="Slide Number Placeholder 3"/>
+          <p:cNvSpPr>
+            <a:spLocks noGrp="1"/>
+          </p:cNvSpPr>
+          <p:nvPr>
+            <p:ph type="sldNum" sz="quarter" idx="10"/>
+          </p:nvPr>
+        </p:nvSpPr>
+        <p:spPr/>
+        <p:txBody>
+          <a:bodyPr/>
+          <a:lstStyle/>
+          <a:p>
+            <a:fld id="{1E7145D9-3B8E-4505-A6EF-634B668909F9}" type="slidenum">
+              <a:rPr lang="en-US" smtClean="0"/>
+              <a:t>8</a:t>
+            </a:fld>
+            <a:endParaRPr lang="en-US"/>
+          </a:p>
+        </p:txBody>
+      </p:sp>
+    </p:spTree>
+    <p:extLst>
+      <p:ext uri="{BB962C8B-B14F-4D97-AF65-F5344CB8AC3E}">
+        <p14:creationId xmlns:p14="http://schemas.microsoft.com/office/powerpoint/2010/main" val="3739978979"/>
+      </p:ext>
+    </p:extLst>
+  </p:cSld>
+  <p:clrMapOvr>
+    <a:masterClrMapping/>
+  </p:clrMapOvr>
+</p:notes>
+</file>
+
+<file path=ppt/notesSlides/notesSlide9.xml><?xml version="1.0" encoding="utf-8"?>
 <p:notes xmlns:a="http://schemas.openxmlformats.org/drawingml/2006/main" xmlns:r="http://schemas.openxmlformats.org/officeDocument/2006/relationships" xmlns:p="http://schemas.openxmlformats.org/presentationml/2006/main" showMasterSp="0" showMasterPhAnim="0">
   <p:cSld>
     <p:spTree>
@@ -1101,387 +2326,37 @@
           </a:bodyPr>
           <a:lstStyle/>
           <a:p>
-            <a:endParaRPr/>
+            <a:pPr rtl="0"/>
+            <a:r>
+              <a:rPr lang="en-US" sz="1200" b="0" i="0" u="none" strike="noStrike" kern="1200" dirty="0" smtClean="0">
+                <a:solidFill>
+                  <a:schemeClr val="tx1"/>
+                </a:solidFill>
+                <a:effectLst/>
+                <a:latin typeface="+mn-lt"/>
+                <a:ea typeface="+mn-ea"/>
+                <a:cs typeface="+mn-cs"/>
+              </a:rPr>
+              <a:t>The project is broken up into multiple parts. The Hydraulics, Raspberry Pi and I2C will primarily be done by Ben. </a:t>
+            </a:r>
+            <a:endParaRPr lang="en-US" b="0" dirty="0" smtClean="0">
+              <a:effectLst/>
+            </a:endParaRPr>
           </a:p>
-        </p:txBody>
-      </p:sp>
-    </p:spTree>
-  </p:cSld>
-  <p:clrMapOvr>
-    <a:masterClrMapping/>
-  </p:clrMapOvr>
-</p:notes>
-</file>
-
-<file path=ppt/notesSlides/notesSlide6.xml><?xml version="1.0" encoding="utf-8"?>
-<p:notes xmlns:a="http://schemas.openxmlformats.org/drawingml/2006/main" xmlns:r="http://schemas.openxmlformats.org/officeDocument/2006/relationships" xmlns:p="http://schemas.openxmlformats.org/presentationml/2006/main" showMasterSp="0" showMasterPhAnim="0">
-  <p:cSld>
-    <p:spTree>
-      <p:nvGrpSpPr>
-        <p:cNvPr id="1" name="Shape 74"/>
-        <p:cNvGrpSpPr/>
-        <p:nvPr/>
-      </p:nvGrpSpPr>
-      <p:grpSpPr>
-        <a:xfrm>
-          <a:off x="0" y="0"/>
-          <a:ext cx="0" cy="0"/>
-          <a:chOff x="0" y="0"/>
-          <a:chExt cx="0" cy="0"/>
-        </a:xfrm>
-      </p:grpSpPr>
-      <p:sp>
-        <p:nvSpPr>
-          <p:cNvPr id="75" name="Shape 75"/>
-          <p:cNvSpPr>
-            <a:spLocks noGrp="1" noRot="1" noChangeAspect="1"/>
-          </p:cNvSpPr>
-          <p:nvPr>
-            <p:ph type="sldImg" idx="2"/>
-          </p:nvPr>
-        </p:nvSpPr>
-        <p:spPr>
-          <a:xfrm>
-            <a:off x="1143000" y="685800"/>
-            <a:ext cx="4572000" cy="3429000"/>
-          </a:xfrm>
-          <a:custGeom>
-            <a:avLst/>
-            <a:gdLst/>
-            <a:ahLst/>
-            <a:cxnLst/>
-            <a:rect l="0" t="0" r="0" b="0"/>
-            <a:pathLst>
-              <a:path w="120000" h="120000" extrusionOk="0">
-                <a:moveTo>
-                  <a:pt x="0" y="0"/>
-                </a:moveTo>
-                <a:lnTo>
-                  <a:pt x="120000" y="0"/>
-                </a:lnTo>
-                <a:lnTo>
-                  <a:pt x="120000" y="120000"/>
-                </a:lnTo>
-                <a:lnTo>
-                  <a:pt x="0" y="120000"/>
-                </a:lnTo>
-                <a:close/>
-              </a:path>
-            </a:pathLst>
-          </a:custGeom>
-        </p:spPr>
-      </p:sp>
-      <p:sp>
-        <p:nvSpPr>
-          <p:cNvPr id="76" name="Shape 76"/>
-          <p:cNvSpPr txBox="1">
-            <a:spLocks noGrp="1"/>
-          </p:cNvSpPr>
-          <p:nvPr>
-            <p:ph type="body" idx="1"/>
-          </p:nvPr>
-        </p:nvSpPr>
-        <p:spPr>
-          <a:xfrm>
-            <a:off x="685800" y="4343400"/>
-            <a:ext cx="5486399" cy="4114800"/>
-          </a:xfrm>
-          <a:prstGeom prst="rect">
-            <a:avLst/>
-          </a:prstGeom>
-        </p:spPr>
-        <p:txBody>
-          <a:bodyPr lIns="91425" tIns="91425" rIns="91425" bIns="91425" anchor="t" anchorCtr="0">
-            <a:noAutofit/>
-          </a:bodyPr>
-          <a:lstStyle/>
           <a:p>
-            <a:endParaRPr/>
-          </a:p>
-        </p:txBody>
-      </p:sp>
-    </p:spTree>
-  </p:cSld>
-  <p:clrMapOvr>
-    <a:masterClrMapping/>
-  </p:clrMapOvr>
-</p:notes>
-</file>
-
-<file path=ppt/notesSlides/notesSlide7.xml><?xml version="1.0" encoding="utf-8"?>
-<p:notes xmlns:a="http://schemas.openxmlformats.org/drawingml/2006/main" xmlns:r="http://schemas.openxmlformats.org/officeDocument/2006/relationships" xmlns:p="http://schemas.openxmlformats.org/presentationml/2006/main" showMasterSp="0" showMasterPhAnim="0">
-  <p:cSld>
-    <p:spTree>
-      <p:nvGrpSpPr>
-        <p:cNvPr id="1" name="Shape 80"/>
-        <p:cNvGrpSpPr/>
-        <p:nvPr/>
-      </p:nvGrpSpPr>
-      <p:grpSpPr>
-        <a:xfrm>
-          <a:off x="0" y="0"/>
-          <a:ext cx="0" cy="0"/>
-          <a:chOff x="0" y="0"/>
-          <a:chExt cx="0" cy="0"/>
-        </a:xfrm>
-      </p:grpSpPr>
-      <p:sp>
-        <p:nvSpPr>
-          <p:cNvPr id="81" name="Shape 81"/>
-          <p:cNvSpPr>
-            <a:spLocks noGrp="1" noRot="1" noChangeAspect="1"/>
-          </p:cNvSpPr>
-          <p:nvPr>
-            <p:ph type="sldImg" idx="2"/>
-          </p:nvPr>
-        </p:nvSpPr>
-        <p:spPr>
-          <a:xfrm>
-            <a:off x="1143000" y="685800"/>
-            <a:ext cx="4572000" cy="3429000"/>
-          </a:xfrm>
-          <a:custGeom>
-            <a:avLst/>
-            <a:gdLst/>
-            <a:ahLst/>
-            <a:cxnLst/>
-            <a:rect l="0" t="0" r="0" b="0"/>
-            <a:pathLst>
-              <a:path w="120000" h="120000" extrusionOk="0">
-                <a:moveTo>
-                  <a:pt x="0" y="0"/>
-                </a:moveTo>
-                <a:lnTo>
-                  <a:pt x="120000" y="0"/>
-                </a:lnTo>
-                <a:lnTo>
-                  <a:pt x="120000" y="120000"/>
-                </a:lnTo>
-                <a:lnTo>
-                  <a:pt x="0" y="120000"/>
-                </a:lnTo>
-                <a:close/>
-              </a:path>
-            </a:pathLst>
-          </a:custGeom>
-        </p:spPr>
-      </p:sp>
-      <p:sp>
-        <p:nvSpPr>
-          <p:cNvPr id="82" name="Shape 82"/>
-          <p:cNvSpPr txBox="1">
-            <a:spLocks noGrp="1"/>
-          </p:cNvSpPr>
-          <p:nvPr>
-            <p:ph type="body" idx="1"/>
-          </p:nvPr>
-        </p:nvSpPr>
-        <p:spPr>
-          <a:xfrm>
-            <a:off x="685800" y="4343400"/>
-            <a:ext cx="5486399" cy="4114800"/>
-          </a:xfrm>
-          <a:prstGeom prst="rect">
-            <a:avLst/>
-          </a:prstGeom>
-        </p:spPr>
-        <p:txBody>
-          <a:bodyPr lIns="91425" tIns="91425" rIns="91425" bIns="91425" anchor="t" anchorCtr="0">
-            <a:noAutofit/>
-          </a:bodyPr>
-          <a:lstStyle/>
-          <a:p>
-            <a:endParaRPr/>
-          </a:p>
-        </p:txBody>
-      </p:sp>
-    </p:spTree>
-  </p:cSld>
-  <p:clrMapOvr>
-    <a:masterClrMapping/>
-  </p:clrMapOvr>
-</p:notes>
-</file>
-
-<file path=ppt/notesSlides/notesSlide8.xml><?xml version="1.0" encoding="utf-8"?>
-<p:notes xmlns:a="http://schemas.openxmlformats.org/drawingml/2006/main" xmlns:r="http://schemas.openxmlformats.org/officeDocument/2006/relationships" xmlns:p="http://schemas.openxmlformats.org/presentationml/2006/main" showMasterSp="0" showMasterPhAnim="0">
-  <p:cSld>
-    <p:spTree>
-      <p:nvGrpSpPr>
-        <p:cNvPr id="1" name="Shape 80"/>
-        <p:cNvGrpSpPr/>
-        <p:nvPr/>
-      </p:nvGrpSpPr>
-      <p:grpSpPr>
-        <a:xfrm>
-          <a:off x="0" y="0"/>
-          <a:ext cx="0" cy="0"/>
-          <a:chOff x="0" y="0"/>
-          <a:chExt cx="0" cy="0"/>
-        </a:xfrm>
-      </p:grpSpPr>
-      <p:sp>
-        <p:nvSpPr>
-          <p:cNvPr id="81" name="Shape 81"/>
-          <p:cNvSpPr>
-            <a:spLocks noGrp="1" noRot="1" noChangeAspect="1"/>
-          </p:cNvSpPr>
-          <p:nvPr>
-            <p:ph type="sldImg" idx="2"/>
-          </p:nvPr>
-        </p:nvSpPr>
-        <p:spPr>
-          <a:xfrm>
-            <a:off x="1143000" y="685800"/>
-            <a:ext cx="4572000" cy="3429000"/>
-          </a:xfrm>
-          <a:custGeom>
-            <a:avLst/>
-            <a:gdLst/>
-            <a:ahLst/>
-            <a:cxnLst/>
-            <a:rect l="0" t="0" r="0" b="0"/>
-            <a:pathLst>
-              <a:path w="120000" h="120000" extrusionOk="0">
-                <a:moveTo>
-                  <a:pt x="0" y="0"/>
-                </a:moveTo>
-                <a:lnTo>
-                  <a:pt x="120000" y="0"/>
-                </a:lnTo>
-                <a:lnTo>
-                  <a:pt x="120000" y="120000"/>
-                </a:lnTo>
-                <a:lnTo>
-                  <a:pt x="0" y="120000"/>
-                </a:lnTo>
-                <a:close/>
-              </a:path>
-            </a:pathLst>
-          </a:custGeom>
-        </p:spPr>
-      </p:sp>
-      <p:sp>
-        <p:nvSpPr>
-          <p:cNvPr id="82" name="Shape 82"/>
-          <p:cNvSpPr txBox="1">
-            <a:spLocks noGrp="1"/>
-          </p:cNvSpPr>
-          <p:nvPr>
-            <p:ph type="body" idx="1"/>
-          </p:nvPr>
-        </p:nvSpPr>
-        <p:spPr>
-          <a:xfrm>
-            <a:off x="685800" y="4343400"/>
-            <a:ext cx="5486399" cy="4114800"/>
-          </a:xfrm>
-          <a:prstGeom prst="rect">
-            <a:avLst/>
-          </a:prstGeom>
-        </p:spPr>
-        <p:txBody>
-          <a:bodyPr lIns="91425" tIns="91425" rIns="91425" bIns="91425" anchor="t" anchorCtr="0">
-            <a:noAutofit/>
-          </a:bodyPr>
-          <a:lstStyle/>
-          <a:p>
-            <a:endParaRPr/>
-          </a:p>
-        </p:txBody>
-      </p:sp>
-    </p:spTree>
-  </p:cSld>
-  <p:clrMapOvr>
-    <a:masterClrMapping/>
-  </p:clrMapOvr>
-</p:notes>
-</file>
-
-<file path=ppt/notesSlides/notesSlide9.xml><?xml version="1.0" encoding="utf-8"?>
-<p:notes xmlns:a="http://schemas.openxmlformats.org/drawingml/2006/main" xmlns:r="http://schemas.openxmlformats.org/officeDocument/2006/relationships" xmlns:p="http://schemas.openxmlformats.org/presentationml/2006/main" showMasterSp="0" showMasterPhAnim="0">
-  <p:cSld>
-    <p:spTree>
-      <p:nvGrpSpPr>
-        <p:cNvPr id="1" name="Shape 80"/>
-        <p:cNvGrpSpPr/>
-        <p:nvPr/>
-      </p:nvGrpSpPr>
-      <p:grpSpPr>
-        <a:xfrm>
-          <a:off x="0" y="0"/>
-          <a:ext cx="0" cy="0"/>
-          <a:chOff x="0" y="0"/>
-          <a:chExt cx="0" cy="0"/>
-        </a:xfrm>
-      </p:grpSpPr>
-      <p:sp>
-        <p:nvSpPr>
-          <p:cNvPr id="81" name="Shape 81"/>
-          <p:cNvSpPr>
-            <a:spLocks noGrp="1" noRot="1" noChangeAspect="1"/>
-          </p:cNvSpPr>
-          <p:nvPr>
-            <p:ph type="sldImg" idx="2"/>
-          </p:nvPr>
-        </p:nvSpPr>
-        <p:spPr>
-          <a:xfrm>
-            <a:off x="1143000" y="685800"/>
-            <a:ext cx="4572000" cy="3429000"/>
-          </a:xfrm>
-          <a:custGeom>
-            <a:avLst/>
-            <a:gdLst/>
-            <a:ahLst/>
-            <a:cxnLst/>
-            <a:rect l="0" t="0" r="0" b="0"/>
-            <a:pathLst>
-              <a:path w="120000" h="120000" extrusionOk="0">
-                <a:moveTo>
-                  <a:pt x="0" y="0"/>
-                </a:moveTo>
-                <a:lnTo>
-                  <a:pt x="120000" y="0"/>
-                </a:lnTo>
-                <a:lnTo>
-                  <a:pt x="120000" y="120000"/>
-                </a:lnTo>
-                <a:lnTo>
-                  <a:pt x="0" y="120000"/>
-                </a:lnTo>
-                <a:close/>
-              </a:path>
-            </a:pathLst>
-          </a:custGeom>
-        </p:spPr>
-      </p:sp>
-      <p:sp>
-        <p:nvSpPr>
-          <p:cNvPr id="82" name="Shape 82"/>
-          <p:cNvSpPr txBox="1">
-            <a:spLocks noGrp="1"/>
-          </p:cNvSpPr>
-          <p:nvPr>
-            <p:ph type="body" idx="1"/>
-          </p:nvPr>
-        </p:nvSpPr>
-        <p:spPr>
-          <a:xfrm>
-            <a:off x="685800" y="4343400"/>
-            <a:ext cx="5486399" cy="4114800"/>
-          </a:xfrm>
-          <a:prstGeom prst="rect">
-            <a:avLst/>
-          </a:prstGeom>
-        </p:spPr>
-        <p:txBody>
-          <a:bodyPr lIns="91425" tIns="91425" rIns="91425" bIns="91425" anchor="t" anchorCtr="0">
-            <a:noAutofit/>
-          </a:bodyPr>
-          <a:lstStyle/>
-          <a:p>
-            <a:endParaRPr/>
+            <a:r>
+              <a:rPr lang="en-US" sz="1200" b="0" i="0" u="none" strike="noStrike" kern="1200" dirty="0" smtClean="0">
+                <a:solidFill>
+                  <a:schemeClr val="tx1"/>
+                </a:solidFill>
+                <a:effectLst/>
+                <a:latin typeface="+mn-lt"/>
+                <a:ea typeface="+mn-ea"/>
+                <a:cs typeface="+mn-cs"/>
+              </a:rPr>
+              <a:t>The Frame, 7-Segment Display and Graphical Interface will be handled primarily by Carter.</a:t>
+            </a:r>
+            <a:endParaRPr dirty="0"/>
           </a:p>
         </p:txBody>
       </p:sp>
@@ -4800,9 +5675,10 @@
               <a:buNone/>
             </a:pPr>
             <a:r>
-              <a:rPr lang="en"/>
-              <a:t>Rough Timeline</a:t>
+              <a:rPr lang="en" dirty="0" smtClean="0"/>
+              <a:t>Preliminary Timeline</a:t>
             </a:r>
+            <a:endParaRPr lang="en" dirty="0"/>
           </a:p>
         </p:txBody>
       </p:sp>
@@ -30353,11 +31229,15 @@
             </a:r>
             <a:r>
               <a:rPr lang="en-US" dirty="0" err="1" smtClean="0"/>
-              <a:t>Trotski</a:t>
+              <a:t>Troitski</a:t>
             </a:r>
             <a:r>
               <a:rPr lang="en-US" dirty="0" smtClean="0"/>
-              <a:t> Competition</a:t>
+              <a:t> </a:t>
+            </a:r>
+            <a:r>
+              <a:rPr lang="en-US" dirty="0" smtClean="0"/>
+              <a:t>Competition</a:t>
             </a:r>
           </a:p>
           <a:p>
@@ -30401,7 +31281,11 @@
           <a:p>
             <a:r>
               <a:rPr lang="en-US" dirty="0" smtClean="0"/>
-              <a:t>8” Piston Throw</a:t>
+              <a:t>14” </a:t>
+            </a:r>
+            <a:r>
+              <a:rPr lang="en-US" dirty="0" smtClean="0"/>
+              <a:t>Piston Throw</a:t>
             </a:r>
             <a:endParaRPr lang="en-US" dirty="0"/>
           </a:p>
@@ -30871,7 +31755,7 @@
             </p:nvSpPr>
             <p:spPr>
               <a:blipFill rotWithShape="1">
-                <a:blip r:embed="rId2"/>
+                <a:blip r:embed="rId3"/>
                 <a:stretch>
                   <a:fillRect l="-1481" t="-2695" r="-1111"/>
                 </a:stretch>

</xml_diff>